<commit_message>
06_Data Binding & Pipes module is done
</commit_message>
<xml_diff>
--- a/Angular/Concepts/Angular.pptx
+++ b/Angular/Concepts/Angular.pptx
@@ -5,7 +5,7 @@
     <p:sldMasterId id="2147483648" r:id="rId1"/>
   </p:sldMasterIdLst>
   <p:notesMasterIdLst>
-    <p:notesMasterId r:id="rId31"/>
+    <p:notesMasterId r:id="rId36"/>
   </p:notesMasterIdLst>
   <p:sldIdLst>
     <p:sldId id="290" r:id="rId2"/>
@@ -37,6 +37,11 @@
     <p:sldId id="316" r:id="rId28"/>
     <p:sldId id="317" r:id="rId29"/>
     <p:sldId id="318" r:id="rId30"/>
+    <p:sldId id="319" r:id="rId31"/>
+    <p:sldId id="320" r:id="rId32"/>
+    <p:sldId id="321" r:id="rId33"/>
+    <p:sldId id="322" r:id="rId34"/>
+    <p:sldId id="323" r:id="rId35"/>
   </p:sldIdLst>
   <p:sldSz cx="12192000" cy="6858000"/>
   <p:notesSz cx="6858000" cy="9144000"/>
@@ -225,7 +230,7 @@
           <a:p>
             <a:fld id="{4A4A6707-0420-4923-8347-096A7F7EA683}" type="datetimeFigureOut">
               <a:rPr lang="en-IN" smtClean="0"/>
-              <a:t>07-02-2021</a:t>
+              <a:t>19-02-2021</a:t>
             </a:fld>
             <a:endParaRPr lang="en-IN"/>
           </a:p>
@@ -2965,6 +2970,534 @@
 </p:notes>
 </file>
 
+<file path=ppt/notesSlides/notesSlide30.xml><?xml version="1.0" encoding="utf-8"?>
+<p:notes xmlns:a="http://schemas.openxmlformats.org/drawingml/2006/main" xmlns:r="http://schemas.openxmlformats.org/officeDocument/2006/relationships" xmlns:p="http://schemas.openxmlformats.org/presentationml/2006/main">
+  <p:cSld>
+    <p:spTree>
+      <p:nvGrpSpPr>
+        <p:cNvPr id="1" name=""/>
+        <p:cNvGrpSpPr/>
+        <p:nvPr/>
+      </p:nvGrpSpPr>
+      <p:grpSpPr>
+        <a:xfrm>
+          <a:off x="0" y="0"/>
+          <a:ext cx="0" cy="0"/>
+          <a:chOff x="0" y="0"/>
+          <a:chExt cx="0" cy="0"/>
+        </a:xfrm>
+      </p:grpSpPr>
+      <p:sp>
+        <p:nvSpPr>
+          <p:cNvPr id="2" name="Slide Image Placeholder 1"/>
+          <p:cNvSpPr>
+            <a:spLocks noGrp="1" noRot="1" noChangeAspect="1"/>
+          </p:cNvSpPr>
+          <p:nvPr>
+            <p:ph type="sldImg"/>
+          </p:nvPr>
+        </p:nvSpPr>
+        <p:spPr/>
+      </p:sp>
+      <p:sp>
+        <p:nvSpPr>
+          <p:cNvPr id="3" name="Notes Placeholder 2"/>
+          <p:cNvSpPr>
+            <a:spLocks noGrp="1"/>
+          </p:cNvSpPr>
+          <p:nvPr>
+            <p:ph type="body" idx="1"/>
+          </p:nvPr>
+        </p:nvSpPr>
+        <p:spPr/>
+        <p:txBody>
+          <a:bodyPr/>
+          <a:lstStyle/>
+          <a:p>
+            <a:pPr marL="0" lvl="0" indent="0">
+              <a:buFontTx/>
+              <a:buNone/>
+            </a:pPr>
+            <a:r>
+              <a:rPr lang="en-IN" b="0" dirty="0"/>
+              <a:t>Different ways of PROPERTY BIINDINDS</a:t>
+            </a:r>
+          </a:p>
+          <a:p>
+            <a:pPr marL="171450" lvl="0" indent="-171450">
+              <a:buFontTx/>
+              <a:buChar char="-"/>
+            </a:pPr>
+            <a:r>
+              <a:rPr lang="en-IN" b="0" dirty="0"/>
+              <a:t>Angular Property Binding</a:t>
+            </a:r>
+          </a:p>
+          <a:p>
+            <a:pPr marL="628650" lvl="1" indent="-171450">
+              <a:buFontTx/>
+              <a:buChar char="-"/>
+            </a:pPr>
+            <a:r>
+              <a:rPr lang="en-IN" b="0" dirty="0"/>
+              <a:t>This is always preferrable</a:t>
+            </a:r>
+          </a:p>
+          <a:p>
+            <a:pPr marL="171450" lvl="0" indent="-171450">
+              <a:buFontTx/>
+              <a:buChar char="-"/>
+            </a:pPr>
+            <a:r>
+              <a:rPr lang="en-IN" b="0" dirty="0"/>
+              <a:t>Interpolation</a:t>
+            </a:r>
+          </a:p>
+          <a:p>
+            <a:pPr marL="628650" lvl="1" indent="-171450">
+              <a:buFontTx/>
+              <a:buChar char="-"/>
+            </a:pPr>
+            <a:r>
+              <a:rPr lang="en-IN" b="0" dirty="0"/>
+              <a:t>But if part value is replaced then its better to have interpolation</a:t>
+            </a:r>
+          </a:p>
+          <a:p>
+            <a:pPr marL="171450" lvl="0" indent="-171450">
+              <a:buFontTx/>
+              <a:buChar char="-"/>
+            </a:pPr>
+            <a:endParaRPr lang="en-IN" b="0" dirty="0"/>
+          </a:p>
+        </p:txBody>
+      </p:sp>
+      <p:sp>
+        <p:nvSpPr>
+          <p:cNvPr id="4" name="Slide Number Placeholder 3"/>
+          <p:cNvSpPr>
+            <a:spLocks noGrp="1"/>
+          </p:cNvSpPr>
+          <p:nvPr>
+            <p:ph type="sldNum" sz="quarter" idx="5"/>
+          </p:nvPr>
+        </p:nvSpPr>
+        <p:spPr/>
+        <p:txBody>
+          <a:bodyPr/>
+          <a:lstStyle/>
+          <a:p>
+            <a:fld id="{113593D2-72D5-4CF2-A8CC-B00F81EF5E34}" type="slidenum">
+              <a:rPr lang="en-IN" smtClean="0"/>
+              <a:t>30</a:t>
+            </a:fld>
+            <a:endParaRPr lang="en-IN"/>
+          </a:p>
+        </p:txBody>
+      </p:sp>
+    </p:spTree>
+    <p:extLst>
+      <p:ext uri="{BB962C8B-B14F-4D97-AF65-F5344CB8AC3E}">
+        <p14:creationId xmlns:p14="http://schemas.microsoft.com/office/powerpoint/2010/main" val="4104354343"/>
+      </p:ext>
+    </p:extLst>
+  </p:cSld>
+  <p:clrMapOvr>
+    <a:masterClrMapping/>
+  </p:clrMapOvr>
+</p:notes>
+</file>
+
+<file path=ppt/notesSlides/notesSlide31.xml><?xml version="1.0" encoding="utf-8"?>
+<p:notes xmlns:a="http://schemas.openxmlformats.org/drawingml/2006/main" xmlns:r="http://schemas.openxmlformats.org/officeDocument/2006/relationships" xmlns:p="http://schemas.openxmlformats.org/presentationml/2006/main">
+  <p:cSld>
+    <p:spTree>
+      <p:nvGrpSpPr>
+        <p:cNvPr id="1" name=""/>
+        <p:cNvGrpSpPr/>
+        <p:nvPr/>
+      </p:nvGrpSpPr>
+      <p:grpSpPr>
+        <a:xfrm>
+          <a:off x="0" y="0"/>
+          <a:ext cx="0" cy="0"/>
+          <a:chOff x="0" y="0"/>
+          <a:chExt cx="0" cy="0"/>
+        </a:xfrm>
+      </p:grpSpPr>
+      <p:sp>
+        <p:nvSpPr>
+          <p:cNvPr id="2" name="Slide Image Placeholder 1"/>
+          <p:cNvSpPr>
+            <a:spLocks noGrp="1" noRot="1" noChangeAspect="1"/>
+          </p:cNvSpPr>
+          <p:nvPr>
+            <p:ph type="sldImg"/>
+          </p:nvPr>
+        </p:nvSpPr>
+        <p:spPr/>
+      </p:sp>
+      <p:sp>
+        <p:nvSpPr>
+          <p:cNvPr id="3" name="Notes Placeholder 2"/>
+          <p:cNvSpPr>
+            <a:spLocks noGrp="1"/>
+          </p:cNvSpPr>
+          <p:nvPr>
+            <p:ph type="body" idx="1"/>
+          </p:nvPr>
+        </p:nvSpPr>
+        <p:spPr/>
+        <p:txBody>
+          <a:bodyPr/>
+          <a:lstStyle/>
+          <a:p>
+            <a:pPr marL="171450" lvl="0" indent="-171450">
+              <a:buFontTx/>
+              <a:buChar char="-"/>
+            </a:pPr>
+            <a:endParaRPr lang="en-IN" b="0" dirty="0"/>
+          </a:p>
+        </p:txBody>
+      </p:sp>
+      <p:sp>
+        <p:nvSpPr>
+          <p:cNvPr id="4" name="Slide Number Placeholder 3"/>
+          <p:cNvSpPr>
+            <a:spLocks noGrp="1"/>
+          </p:cNvSpPr>
+          <p:nvPr>
+            <p:ph type="sldNum" sz="quarter" idx="5"/>
+          </p:nvPr>
+        </p:nvSpPr>
+        <p:spPr/>
+        <p:txBody>
+          <a:bodyPr/>
+          <a:lstStyle/>
+          <a:p>
+            <a:fld id="{113593D2-72D5-4CF2-A8CC-B00F81EF5E34}" type="slidenum">
+              <a:rPr lang="en-IN" smtClean="0"/>
+              <a:t>31</a:t>
+            </a:fld>
+            <a:endParaRPr lang="en-IN"/>
+          </a:p>
+        </p:txBody>
+      </p:sp>
+    </p:spTree>
+    <p:extLst>
+      <p:ext uri="{BB962C8B-B14F-4D97-AF65-F5344CB8AC3E}">
+        <p14:creationId xmlns:p14="http://schemas.microsoft.com/office/powerpoint/2010/main" val="3440500648"/>
+      </p:ext>
+    </p:extLst>
+  </p:cSld>
+  <p:clrMapOvr>
+    <a:masterClrMapping/>
+  </p:clrMapOvr>
+</p:notes>
+</file>
+
+<file path=ppt/notesSlides/notesSlide32.xml><?xml version="1.0" encoding="utf-8"?>
+<p:notes xmlns:a="http://schemas.openxmlformats.org/drawingml/2006/main" xmlns:r="http://schemas.openxmlformats.org/officeDocument/2006/relationships" xmlns:p="http://schemas.openxmlformats.org/presentationml/2006/main">
+  <p:cSld>
+    <p:spTree>
+      <p:nvGrpSpPr>
+        <p:cNvPr id="1" name=""/>
+        <p:cNvGrpSpPr/>
+        <p:nvPr/>
+      </p:nvGrpSpPr>
+      <p:grpSpPr>
+        <a:xfrm>
+          <a:off x="0" y="0"/>
+          <a:ext cx="0" cy="0"/>
+          <a:chOff x="0" y="0"/>
+          <a:chExt cx="0" cy="0"/>
+        </a:xfrm>
+      </p:grpSpPr>
+      <p:sp>
+        <p:nvSpPr>
+          <p:cNvPr id="2" name="Slide Image Placeholder 1"/>
+          <p:cNvSpPr>
+            <a:spLocks noGrp="1" noRot="1" noChangeAspect="1"/>
+          </p:cNvSpPr>
+          <p:nvPr>
+            <p:ph type="sldImg"/>
+          </p:nvPr>
+        </p:nvSpPr>
+        <p:spPr/>
+      </p:sp>
+      <p:sp>
+        <p:nvSpPr>
+          <p:cNvPr id="3" name="Notes Placeholder 2"/>
+          <p:cNvSpPr>
+            <a:spLocks noGrp="1"/>
+          </p:cNvSpPr>
+          <p:nvPr>
+            <p:ph type="body" idx="1"/>
+          </p:nvPr>
+        </p:nvSpPr>
+        <p:spPr/>
+        <p:txBody>
+          <a:bodyPr/>
+          <a:lstStyle/>
+          <a:p>
+            <a:pPr marL="171450" lvl="0" indent="-171450">
+              <a:buFontTx/>
+              <a:buChar char="-"/>
+            </a:pPr>
+            <a:r>
+              <a:rPr lang="en-IN" b="0" dirty="0"/>
+              <a:t>To indicate two way binding, we use </a:t>
+            </a:r>
+            <a:r>
+              <a:rPr lang="en-IN" b="1" dirty="0" err="1"/>
+              <a:t>ngModel</a:t>
+            </a:r>
+            <a:r>
+              <a:rPr lang="en-IN" b="0" dirty="0"/>
+              <a:t> directive</a:t>
+            </a:r>
+          </a:p>
+          <a:p>
+            <a:pPr marL="171450" lvl="0" indent="-171450">
+              <a:buFontTx/>
+              <a:buChar char="-"/>
+            </a:pPr>
+            <a:r>
+              <a:rPr lang="en-IN" b="0" dirty="0"/>
+              <a:t>[ ] = indicate property binding  - from the class property to the input element</a:t>
+            </a:r>
+          </a:p>
+          <a:p>
+            <a:pPr marL="171450" lvl="0" indent="-171450">
+              <a:buFontTx/>
+              <a:buChar char="-"/>
+            </a:pPr>
+            <a:r>
+              <a:rPr lang="en-IN" b="0" dirty="0"/>
+              <a:t>( ) = indicate event binding – to send a notification of the event entered data to the class property</a:t>
+            </a:r>
+          </a:p>
+          <a:p>
+            <a:pPr marL="171450" lvl="0" indent="-171450">
+              <a:buFontTx/>
+              <a:buChar char="-"/>
+            </a:pPr>
+            <a:endParaRPr lang="en-IN" b="0" dirty="0"/>
+          </a:p>
+        </p:txBody>
+      </p:sp>
+      <p:sp>
+        <p:nvSpPr>
+          <p:cNvPr id="4" name="Slide Number Placeholder 3"/>
+          <p:cNvSpPr>
+            <a:spLocks noGrp="1"/>
+          </p:cNvSpPr>
+          <p:nvPr>
+            <p:ph type="sldNum" sz="quarter" idx="5"/>
+          </p:nvPr>
+        </p:nvSpPr>
+        <p:spPr/>
+        <p:txBody>
+          <a:bodyPr/>
+          <a:lstStyle/>
+          <a:p>
+            <a:fld id="{113593D2-72D5-4CF2-A8CC-B00F81EF5E34}" type="slidenum">
+              <a:rPr lang="en-IN" smtClean="0"/>
+              <a:t>32</a:t>
+            </a:fld>
+            <a:endParaRPr lang="en-IN"/>
+          </a:p>
+        </p:txBody>
+      </p:sp>
+    </p:spTree>
+    <p:extLst>
+      <p:ext uri="{BB962C8B-B14F-4D97-AF65-F5344CB8AC3E}">
+        <p14:creationId xmlns:p14="http://schemas.microsoft.com/office/powerpoint/2010/main" val="276720510"/>
+      </p:ext>
+    </p:extLst>
+  </p:cSld>
+  <p:clrMapOvr>
+    <a:masterClrMapping/>
+  </p:clrMapOvr>
+</p:notes>
+</file>
+
+<file path=ppt/notesSlides/notesSlide33.xml><?xml version="1.0" encoding="utf-8"?>
+<p:notes xmlns:a="http://schemas.openxmlformats.org/drawingml/2006/main" xmlns:r="http://schemas.openxmlformats.org/officeDocument/2006/relationships" xmlns:p="http://schemas.openxmlformats.org/presentationml/2006/main">
+  <p:cSld>
+    <p:spTree>
+      <p:nvGrpSpPr>
+        <p:cNvPr id="1" name=""/>
+        <p:cNvGrpSpPr/>
+        <p:nvPr/>
+      </p:nvGrpSpPr>
+      <p:grpSpPr>
+        <a:xfrm>
+          <a:off x="0" y="0"/>
+          <a:ext cx="0" cy="0"/>
+          <a:chOff x="0" y="0"/>
+          <a:chExt cx="0" cy="0"/>
+        </a:xfrm>
+      </p:grpSpPr>
+      <p:sp>
+        <p:nvSpPr>
+          <p:cNvPr id="2" name="Slide Image Placeholder 1"/>
+          <p:cNvSpPr>
+            <a:spLocks noGrp="1" noRot="1" noChangeAspect="1"/>
+          </p:cNvSpPr>
+          <p:nvPr>
+            <p:ph type="sldImg"/>
+          </p:nvPr>
+        </p:nvSpPr>
+        <p:spPr/>
+      </p:sp>
+      <p:sp>
+        <p:nvSpPr>
+          <p:cNvPr id="3" name="Notes Placeholder 2"/>
+          <p:cNvSpPr>
+            <a:spLocks noGrp="1"/>
+          </p:cNvSpPr>
+          <p:nvPr>
+            <p:ph type="body" idx="1"/>
+          </p:nvPr>
+        </p:nvSpPr>
+        <p:spPr/>
+        <p:txBody>
+          <a:bodyPr/>
+          <a:lstStyle/>
+          <a:p>
+            <a:pPr marL="171450" lvl="0" indent="-171450">
+              <a:buFontTx/>
+              <a:buChar char="-"/>
+            </a:pPr>
+            <a:endParaRPr lang="en-IN" b="0" dirty="0"/>
+          </a:p>
+        </p:txBody>
+      </p:sp>
+      <p:sp>
+        <p:nvSpPr>
+          <p:cNvPr id="4" name="Slide Number Placeholder 3"/>
+          <p:cNvSpPr>
+            <a:spLocks noGrp="1"/>
+          </p:cNvSpPr>
+          <p:nvPr>
+            <p:ph type="sldNum" sz="quarter" idx="5"/>
+          </p:nvPr>
+        </p:nvSpPr>
+        <p:spPr/>
+        <p:txBody>
+          <a:bodyPr/>
+          <a:lstStyle/>
+          <a:p>
+            <a:fld id="{113593D2-72D5-4CF2-A8CC-B00F81EF5E34}" type="slidenum">
+              <a:rPr lang="en-IN" smtClean="0"/>
+              <a:t>33</a:t>
+            </a:fld>
+            <a:endParaRPr lang="en-IN"/>
+          </a:p>
+        </p:txBody>
+      </p:sp>
+    </p:spTree>
+    <p:extLst>
+      <p:ext uri="{BB962C8B-B14F-4D97-AF65-F5344CB8AC3E}">
+        <p14:creationId xmlns:p14="http://schemas.microsoft.com/office/powerpoint/2010/main" val="2479799727"/>
+      </p:ext>
+    </p:extLst>
+  </p:cSld>
+  <p:clrMapOvr>
+    <a:masterClrMapping/>
+  </p:clrMapOvr>
+</p:notes>
+</file>
+
+<file path=ppt/notesSlides/notesSlide34.xml><?xml version="1.0" encoding="utf-8"?>
+<p:notes xmlns:a="http://schemas.openxmlformats.org/drawingml/2006/main" xmlns:r="http://schemas.openxmlformats.org/officeDocument/2006/relationships" xmlns:p="http://schemas.openxmlformats.org/presentationml/2006/main">
+  <p:cSld>
+    <p:spTree>
+      <p:nvGrpSpPr>
+        <p:cNvPr id="1" name=""/>
+        <p:cNvGrpSpPr/>
+        <p:nvPr/>
+      </p:nvGrpSpPr>
+      <p:grpSpPr>
+        <a:xfrm>
+          <a:off x="0" y="0"/>
+          <a:ext cx="0" cy="0"/>
+          <a:chOff x="0" y="0"/>
+          <a:chExt cx="0" cy="0"/>
+        </a:xfrm>
+      </p:grpSpPr>
+      <p:sp>
+        <p:nvSpPr>
+          <p:cNvPr id="2" name="Slide Image Placeholder 1"/>
+          <p:cNvSpPr>
+            <a:spLocks noGrp="1" noRot="1" noChangeAspect="1"/>
+          </p:cNvSpPr>
+          <p:nvPr>
+            <p:ph type="sldImg"/>
+          </p:nvPr>
+        </p:nvSpPr>
+        <p:spPr/>
+      </p:sp>
+      <p:sp>
+        <p:nvSpPr>
+          <p:cNvPr id="3" name="Notes Placeholder 2"/>
+          <p:cNvSpPr>
+            <a:spLocks noGrp="1"/>
+          </p:cNvSpPr>
+          <p:nvPr>
+            <p:ph type="body" idx="1"/>
+          </p:nvPr>
+        </p:nvSpPr>
+        <p:spPr/>
+        <p:txBody>
+          <a:bodyPr/>
+          <a:lstStyle/>
+          <a:p>
+            <a:pPr marL="171450" lvl="0" indent="-171450">
+              <a:buFontTx/>
+              <a:buChar char="-"/>
+            </a:pPr>
+            <a:endParaRPr lang="en-IN" b="0" dirty="0"/>
+          </a:p>
+        </p:txBody>
+      </p:sp>
+      <p:sp>
+        <p:nvSpPr>
+          <p:cNvPr id="4" name="Slide Number Placeholder 3"/>
+          <p:cNvSpPr>
+            <a:spLocks noGrp="1"/>
+          </p:cNvSpPr>
+          <p:nvPr>
+            <p:ph type="sldNum" sz="quarter" idx="5"/>
+          </p:nvPr>
+        </p:nvSpPr>
+        <p:spPr/>
+        <p:txBody>
+          <a:bodyPr/>
+          <a:lstStyle/>
+          <a:p>
+            <a:fld id="{113593D2-72D5-4CF2-A8CC-B00F81EF5E34}" type="slidenum">
+              <a:rPr lang="en-IN" smtClean="0"/>
+              <a:t>34</a:t>
+            </a:fld>
+            <a:endParaRPr lang="en-IN"/>
+          </a:p>
+        </p:txBody>
+      </p:sp>
+    </p:spTree>
+    <p:extLst>
+      <p:ext uri="{BB962C8B-B14F-4D97-AF65-F5344CB8AC3E}">
+        <p14:creationId xmlns:p14="http://schemas.microsoft.com/office/powerpoint/2010/main" val="2895681260"/>
+      </p:ext>
+    </p:extLst>
+  </p:cSld>
+  <p:clrMapOvr>
+    <a:masterClrMapping/>
+  </p:clrMapOvr>
+</p:notes>
+</file>
+
 <file path=ppt/notesSlides/notesSlide4.xml><?xml version="1.0" encoding="utf-8"?>
 <p:notes xmlns:a="http://schemas.openxmlformats.org/drawingml/2006/main" xmlns:r="http://schemas.openxmlformats.org/officeDocument/2006/relationships" xmlns:p="http://schemas.openxmlformats.org/presentationml/2006/main">
   <p:cSld>
@@ -3840,7 +4373,7 @@
           <a:p>
             <a:fld id="{A30DF74A-7692-4505-96EF-A63108FD53F9}" type="datetimeFigureOut">
               <a:rPr lang="en-IN" smtClean="0"/>
-              <a:t>07-02-2021</a:t>
+              <a:t>19-02-2021</a:t>
             </a:fld>
             <a:endParaRPr lang="en-IN"/>
           </a:p>
@@ -4040,7 +4573,7 @@
           <a:p>
             <a:fld id="{A30DF74A-7692-4505-96EF-A63108FD53F9}" type="datetimeFigureOut">
               <a:rPr lang="en-IN" smtClean="0"/>
-              <a:t>07-02-2021</a:t>
+              <a:t>19-02-2021</a:t>
             </a:fld>
             <a:endParaRPr lang="en-IN"/>
           </a:p>
@@ -4250,7 +4783,7 @@
           <a:p>
             <a:fld id="{A30DF74A-7692-4505-96EF-A63108FD53F9}" type="datetimeFigureOut">
               <a:rPr lang="en-IN" smtClean="0"/>
-              <a:t>07-02-2021</a:t>
+              <a:t>19-02-2021</a:t>
             </a:fld>
             <a:endParaRPr lang="en-IN"/>
           </a:p>
@@ -4450,7 +4983,7 @@
           <a:p>
             <a:fld id="{A30DF74A-7692-4505-96EF-A63108FD53F9}" type="datetimeFigureOut">
               <a:rPr lang="en-IN" smtClean="0"/>
-              <a:t>07-02-2021</a:t>
+              <a:t>19-02-2021</a:t>
             </a:fld>
             <a:endParaRPr lang="en-IN"/>
           </a:p>
@@ -4726,7 +5259,7 @@
           <a:p>
             <a:fld id="{A30DF74A-7692-4505-96EF-A63108FD53F9}" type="datetimeFigureOut">
               <a:rPr lang="en-IN" smtClean="0"/>
-              <a:t>07-02-2021</a:t>
+              <a:t>19-02-2021</a:t>
             </a:fld>
             <a:endParaRPr lang="en-IN"/>
           </a:p>
@@ -4994,7 +5527,7 @@
           <a:p>
             <a:fld id="{A30DF74A-7692-4505-96EF-A63108FD53F9}" type="datetimeFigureOut">
               <a:rPr lang="en-IN" smtClean="0"/>
-              <a:t>07-02-2021</a:t>
+              <a:t>19-02-2021</a:t>
             </a:fld>
             <a:endParaRPr lang="en-IN"/>
           </a:p>
@@ -5409,7 +5942,7 @@
           <a:p>
             <a:fld id="{A30DF74A-7692-4505-96EF-A63108FD53F9}" type="datetimeFigureOut">
               <a:rPr lang="en-IN" smtClean="0"/>
-              <a:t>07-02-2021</a:t>
+              <a:t>19-02-2021</a:t>
             </a:fld>
             <a:endParaRPr lang="en-IN"/>
           </a:p>
@@ -5551,7 +6084,7 @@
           <a:p>
             <a:fld id="{A30DF74A-7692-4505-96EF-A63108FD53F9}" type="datetimeFigureOut">
               <a:rPr lang="en-IN" smtClean="0"/>
-              <a:t>07-02-2021</a:t>
+              <a:t>19-02-2021</a:t>
             </a:fld>
             <a:endParaRPr lang="en-IN"/>
           </a:p>
@@ -5664,7 +6197,7 @@
           <a:p>
             <a:fld id="{A30DF74A-7692-4505-96EF-A63108FD53F9}" type="datetimeFigureOut">
               <a:rPr lang="en-IN" smtClean="0"/>
-              <a:t>07-02-2021</a:t>
+              <a:t>19-02-2021</a:t>
             </a:fld>
             <a:endParaRPr lang="en-IN"/>
           </a:p>
@@ -5977,7 +6510,7 @@
           <a:p>
             <a:fld id="{A30DF74A-7692-4505-96EF-A63108FD53F9}" type="datetimeFigureOut">
               <a:rPr lang="en-IN" smtClean="0"/>
-              <a:t>07-02-2021</a:t>
+              <a:t>19-02-2021</a:t>
             </a:fld>
             <a:endParaRPr lang="en-IN"/>
           </a:p>
@@ -6266,7 +6799,7 @@
           <a:p>
             <a:fld id="{A30DF74A-7692-4505-96EF-A63108FD53F9}" type="datetimeFigureOut">
               <a:rPr lang="en-IN" smtClean="0"/>
-              <a:t>07-02-2021</a:t>
+              <a:t>19-02-2021</a:t>
             </a:fld>
             <a:endParaRPr lang="en-IN"/>
           </a:p>
@@ -6509,7 +7042,7 @@
           <a:p>
             <a:fld id="{A30DF74A-7692-4505-96EF-A63108FD53F9}" type="datetimeFigureOut">
               <a:rPr lang="en-IN" smtClean="0"/>
-              <a:t>07-02-2021</a:t>
+              <a:t>19-02-2021</a:t>
             </a:fld>
             <a:endParaRPr lang="en-IN"/>
           </a:p>
@@ -8326,6 +8859,456 @@
     <p:extLst>
       <p:ext uri="{BB962C8B-B14F-4D97-AF65-F5344CB8AC3E}">
         <p14:creationId xmlns:p14="http://schemas.microsoft.com/office/powerpoint/2010/main" val="3372588569"/>
+      </p:ext>
+    </p:extLst>
+  </p:cSld>
+  <p:clrMapOvr>
+    <a:masterClrMapping/>
+  </p:clrMapOvr>
+</p:sld>
+</file>
+
+<file path=ppt/slides/slide30.xml><?xml version="1.0" encoding="utf-8"?>
+<p:sld xmlns:a="http://schemas.openxmlformats.org/drawingml/2006/main" xmlns:r="http://schemas.openxmlformats.org/officeDocument/2006/relationships" xmlns:p="http://schemas.openxmlformats.org/presentationml/2006/main">
+  <p:cSld>
+    <p:spTree>
+      <p:nvGrpSpPr>
+        <p:cNvPr id="1" name=""/>
+        <p:cNvGrpSpPr/>
+        <p:nvPr/>
+      </p:nvGrpSpPr>
+      <p:grpSpPr>
+        <a:xfrm>
+          <a:off x="0" y="0"/>
+          <a:ext cx="0" cy="0"/>
+          <a:chOff x="0" y="0"/>
+          <a:chExt cx="0" cy="0"/>
+        </a:xfrm>
+      </p:grpSpPr>
+      <p:pic>
+        <p:nvPicPr>
+          <p:cNvPr id="2" name="Picture 1">
+            <a:extLst>
+              <a:ext uri="{FF2B5EF4-FFF2-40B4-BE49-F238E27FC236}">
+                <a16:creationId xmlns:a16="http://schemas.microsoft.com/office/drawing/2014/main" id="{2A3BD3E5-0781-4A63-B673-C30F37A0D3CA}"/>
+              </a:ext>
+            </a:extLst>
+          </p:cNvPr>
+          <p:cNvPicPr>
+            <a:picLocks noChangeAspect="1"/>
+          </p:cNvPicPr>
+          <p:nvPr/>
+        </p:nvPicPr>
+        <p:blipFill>
+          <a:blip r:embed="rId3"/>
+          <a:stretch>
+            <a:fillRect/>
+          </a:stretch>
+        </p:blipFill>
+        <p:spPr>
+          <a:xfrm>
+            <a:off x="185531" y="274636"/>
+            <a:ext cx="12192000" cy="3896832"/>
+          </a:xfrm>
+          <a:prstGeom prst="rect">
+            <a:avLst/>
+          </a:prstGeom>
+        </p:spPr>
+      </p:pic>
+      <p:pic>
+        <p:nvPicPr>
+          <p:cNvPr id="3" name="Picture 2">
+            <a:extLst>
+              <a:ext uri="{FF2B5EF4-FFF2-40B4-BE49-F238E27FC236}">
+                <a16:creationId xmlns:a16="http://schemas.microsoft.com/office/drawing/2014/main" id="{7DDA235B-02C9-4014-AEC2-8D202C37E368}"/>
+              </a:ext>
+            </a:extLst>
+          </p:cNvPr>
+          <p:cNvPicPr>
+            <a:picLocks noChangeAspect="1"/>
+          </p:cNvPicPr>
+          <p:nvPr/>
+        </p:nvPicPr>
+        <p:blipFill>
+          <a:blip r:embed="rId4"/>
+          <a:stretch>
+            <a:fillRect/>
+          </a:stretch>
+        </p:blipFill>
+        <p:spPr>
+          <a:xfrm>
+            <a:off x="1063393" y="4729899"/>
+            <a:ext cx="9800169" cy="1531753"/>
+          </a:xfrm>
+          <a:prstGeom prst="rect">
+            <a:avLst/>
+          </a:prstGeom>
+        </p:spPr>
+      </p:pic>
+    </p:spTree>
+    <p:extLst>
+      <p:ext uri="{BB962C8B-B14F-4D97-AF65-F5344CB8AC3E}">
+        <p14:creationId xmlns:p14="http://schemas.microsoft.com/office/powerpoint/2010/main" val="304981257"/>
+      </p:ext>
+    </p:extLst>
+  </p:cSld>
+  <p:clrMapOvr>
+    <a:masterClrMapping/>
+  </p:clrMapOvr>
+</p:sld>
+</file>
+
+<file path=ppt/slides/slide31.xml><?xml version="1.0" encoding="utf-8"?>
+<p:sld xmlns:a="http://schemas.openxmlformats.org/drawingml/2006/main" xmlns:r="http://schemas.openxmlformats.org/officeDocument/2006/relationships" xmlns:p="http://schemas.openxmlformats.org/presentationml/2006/main">
+  <p:cSld>
+    <p:spTree>
+      <p:nvGrpSpPr>
+        <p:cNvPr id="1" name=""/>
+        <p:cNvGrpSpPr/>
+        <p:nvPr/>
+      </p:nvGrpSpPr>
+      <p:grpSpPr>
+        <a:xfrm>
+          <a:off x="0" y="0"/>
+          <a:ext cx="0" cy="0"/>
+          <a:chOff x="0" y="0"/>
+          <a:chExt cx="0" cy="0"/>
+        </a:xfrm>
+      </p:grpSpPr>
+      <p:pic>
+        <p:nvPicPr>
+          <p:cNvPr id="3" name="Picture 2">
+            <a:extLst>
+              <a:ext uri="{FF2B5EF4-FFF2-40B4-BE49-F238E27FC236}">
+                <a16:creationId xmlns:a16="http://schemas.microsoft.com/office/drawing/2014/main" id="{BC163B93-869F-4107-88B9-52133ACB931E}"/>
+              </a:ext>
+            </a:extLst>
+          </p:cNvPr>
+          <p:cNvPicPr>
+            <a:picLocks noChangeAspect="1"/>
+          </p:cNvPicPr>
+          <p:nvPr/>
+        </p:nvPicPr>
+        <p:blipFill>
+          <a:blip r:embed="rId3"/>
+          <a:stretch>
+            <a:fillRect/>
+          </a:stretch>
+        </p:blipFill>
+        <p:spPr>
+          <a:xfrm>
+            <a:off x="0" y="527758"/>
+            <a:ext cx="12192000" cy="4238727"/>
+          </a:xfrm>
+          <a:prstGeom prst="rect">
+            <a:avLst/>
+          </a:prstGeom>
+        </p:spPr>
+      </p:pic>
+      <p:pic>
+        <p:nvPicPr>
+          <p:cNvPr id="4" name="Picture 3">
+            <a:extLst>
+              <a:ext uri="{FF2B5EF4-FFF2-40B4-BE49-F238E27FC236}">
+                <a16:creationId xmlns:a16="http://schemas.microsoft.com/office/drawing/2014/main" id="{E1AFE29C-95B8-432B-BF66-893BB3F139A3}"/>
+              </a:ext>
+            </a:extLst>
+          </p:cNvPr>
+          <p:cNvPicPr>
+            <a:picLocks noChangeAspect="1"/>
+          </p:cNvPicPr>
+          <p:nvPr/>
+        </p:nvPicPr>
+        <p:blipFill>
+          <a:blip r:embed="rId4"/>
+          <a:stretch>
+            <a:fillRect/>
+          </a:stretch>
+        </p:blipFill>
+        <p:spPr>
+          <a:xfrm>
+            <a:off x="173410" y="5115279"/>
+            <a:ext cx="4450466" cy="1371719"/>
+          </a:xfrm>
+          <a:prstGeom prst="rect">
+            <a:avLst/>
+          </a:prstGeom>
+        </p:spPr>
+      </p:pic>
+      <p:pic>
+        <p:nvPicPr>
+          <p:cNvPr id="5" name="Picture 4">
+            <a:extLst>
+              <a:ext uri="{FF2B5EF4-FFF2-40B4-BE49-F238E27FC236}">
+                <a16:creationId xmlns:a16="http://schemas.microsoft.com/office/drawing/2014/main" id="{4D95872D-7E1F-43A1-91C7-48B78FB7A979}"/>
+              </a:ext>
+            </a:extLst>
+          </p:cNvPr>
+          <p:cNvPicPr>
+            <a:picLocks noChangeAspect="1"/>
+          </p:cNvPicPr>
+          <p:nvPr/>
+        </p:nvPicPr>
+        <p:blipFill>
+          <a:blip r:embed="rId5"/>
+          <a:stretch>
+            <a:fillRect/>
+          </a:stretch>
+        </p:blipFill>
+        <p:spPr>
+          <a:xfrm>
+            <a:off x="5045446" y="4879038"/>
+            <a:ext cx="3558848" cy="1844200"/>
+          </a:xfrm>
+          <a:prstGeom prst="rect">
+            <a:avLst/>
+          </a:prstGeom>
+        </p:spPr>
+      </p:pic>
+    </p:spTree>
+    <p:extLst>
+      <p:ext uri="{BB962C8B-B14F-4D97-AF65-F5344CB8AC3E}">
+        <p14:creationId xmlns:p14="http://schemas.microsoft.com/office/powerpoint/2010/main" val="1157517484"/>
+      </p:ext>
+    </p:extLst>
+  </p:cSld>
+  <p:clrMapOvr>
+    <a:masterClrMapping/>
+  </p:clrMapOvr>
+</p:sld>
+</file>
+
+<file path=ppt/slides/slide32.xml><?xml version="1.0" encoding="utf-8"?>
+<p:sld xmlns:a="http://schemas.openxmlformats.org/drawingml/2006/main" xmlns:r="http://schemas.openxmlformats.org/officeDocument/2006/relationships" xmlns:p="http://schemas.openxmlformats.org/presentationml/2006/main">
+  <p:cSld>
+    <p:spTree>
+      <p:nvGrpSpPr>
+        <p:cNvPr id="1" name=""/>
+        <p:cNvGrpSpPr/>
+        <p:nvPr/>
+      </p:nvGrpSpPr>
+      <p:grpSpPr>
+        <a:xfrm>
+          <a:off x="0" y="0"/>
+          <a:ext cx="0" cy="0"/>
+          <a:chOff x="0" y="0"/>
+          <a:chExt cx="0" cy="0"/>
+        </a:xfrm>
+      </p:grpSpPr>
+      <p:pic>
+        <p:nvPicPr>
+          <p:cNvPr id="6" name="Picture 5">
+            <a:extLst>
+              <a:ext uri="{FF2B5EF4-FFF2-40B4-BE49-F238E27FC236}">
+                <a16:creationId xmlns:a16="http://schemas.microsoft.com/office/drawing/2014/main" id="{2B0D1458-44C7-45D0-9460-5B70D71C69F0}"/>
+              </a:ext>
+            </a:extLst>
+          </p:cNvPr>
+          <p:cNvPicPr>
+            <a:picLocks noChangeAspect="1"/>
+          </p:cNvPicPr>
+          <p:nvPr/>
+        </p:nvPicPr>
+        <p:blipFill>
+          <a:blip r:embed="rId3"/>
+          <a:stretch>
+            <a:fillRect/>
+          </a:stretch>
+        </p:blipFill>
+        <p:spPr>
+          <a:xfrm>
+            <a:off x="327160" y="1002491"/>
+            <a:ext cx="11537680" cy="4640982"/>
+          </a:xfrm>
+          <a:prstGeom prst="rect">
+            <a:avLst/>
+          </a:prstGeom>
+        </p:spPr>
+      </p:pic>
+    </p:spTree>
+    <p:extLst>
+      <p:ext uri="{BB962C8B-B14F-4D97-AF65-F5344CB8AC3E}">
+        <p14:creationId xmlns:p14="http://schemas.microsoft.com/office/powerpoint/2010/main" val="2340102227"/>
+      </p:ext>
+    </p:extLst>
+  </p:cSld>
+  <p:clrMapOvr>
+    <a:masterClrMapping/>
+  </p:clrMapOvr>
+</p:sld>
+</file>
+
+<file path=ppt/slides/slide33.xml><?xml version="1.0" encoding="utf-8"?>
+<p:sld xmlns:a="http://schemas.openxmlformats.org/drawingml/2006/main" xmlns:r="http://schemas.openxmlformats.org/officeDocument/2006/relationships" xmlns:p="http://schemas.openxmlformats.org/presentationml/2006/main">
+  <p:cSld>
+    <p:spTree>
+      <p:nvGrpSpPr>
+        <p:cNvPr id="1" name=""/>
+        <p:cNvGrpSpPr/>
+        <p:nvPr/>
+      </p:nvGrpSpPr>
+      <p:grpSpPr>
+        <a:xfrm>
+          <a:off x="0" y="0"/>
+          <a:ext cx="0" cy="0"/>
+          <a:chOff x="0" y="0"/>
+          <a:chExt cx="0" cy="0"/>
+        </a:xfrm>
+      </p:grpSpPr>
+      <p:pic>
+        <p:nvPicPr>
+          <p:cNvPr id="2" name="Picture 1">
+            <a:extLst>
+              <a:ext uri="{FF2B5EF4-FFF2-40B4-BE49-F238E27FC236}">
+                <a16:creationId xmlns:a16="http://schemas.microsoft.com/office/drawing/2014/main" id="{3ABA7223-1003-4D3D-B77E-0C8FA6128F79}"/>
+              </a:ext>
+            </a:extLst>
+          </p:cNvPr>
+          <p:cNvPicPr>
+            <a:picLocks noChangeAspect="1"/>
+          </p:cNvPicPr>
+          <p:nvPr/>
+        </p:nvPicPr>
+        <p:blipFill>
+          <a:blip r:embed="rId3"/>
+          <a:stretch>
+            <a:fillRect/>
+          </a:stretch>
+        </p:blipFill>
+        <p:spPr>
+          <a:xfrm>
+            <a:off x="849175" y="0"/>
+            <a:ext cx="10493649" cy="6058425"/>
+          </a:xfrm>
+          <a:prstGeom prst="rect">
+            <a:avLst/>
+          </a:prstGeom>
+        </p:spPr>
+      </p:pic>
+      <p:pic>
+        <p:nvPicPr>
+          <p:cNvPr id="3" name="Picture 2">
+            <a:extLst>
+              <a:ext uri="{FF2B5EF4-FFF2-40B4-BE49-F238E27FC236}">
+                <a16:creationId xmlns:a16="http://schemas.microsoft.com/office/drawing/2014/main" id="{9F47CF28-F7B9-4A58-958E-3B5A4A0E11E8}"/>
+              </a:ext>
+            </a:extLst>
+          </p:cNvPr>
+          <p:cNvPicPr>
+            <a:picLocks noChangeAspect="1"/>
+          </p:cNvPicPr>
+          <p:nvPr/>
+        </p:nvPicPr>
+        <p:blipFill>
+          <a:blip r:embed="rId4"/>
+          <a:stretch>
+            <a:fillRect/>
+          </a:stretch>
+        </p:blipFill>
+        <p:spPr>
+          <a:xfrm>
+            <a:off x="4372203" y="6271209"/>
+            <a:ext cx="7819798" cy="586791"/>
+          </a:xfrm>
+          <a:prstGeom prst="rect">
+            <a:avLst/>
+          </a:prstGeom>
+        </p:spPr>
+      </p:pic>
+      <p:pic>
+        <p:nvPicPr>
+          <p:cNvPr id="4" name="Picture 3">
+            <a:extLst>
+              <a:ext uri="{FF2B5EF4-FFF2-40B4-BE49-F238E27FC236}">
+                <a16:creationId xmlns:a16="http://schemas.microsoft.com/office/drawing/2014/main" id="{0F138B30-488A-4AA4-B555-6E1A64D7F57A}"/>
+              </a:ext>
+            </a:extLst>
+          </p:cNvPr>
+          <p:cNvPicPr>
+            <a:picLocks noChangeAspect="1"/>
+          </p:cNvPicPr>
+          <p:nvPr/>
+        </p:nvPicPr>
+        <p:blipFill>
+          <a:blip r:embed="rId5"/>
+          <a:stretch>
+            <a:fillRect/>
+          </a:stretch>
+        </p:blipFill>
+        <p:spPr>
+          <a:xfrm>
+            <a:off x="129533" y="6168789"/>
+            <a:ext cx="3955123" cy="632515"/>
+          </a:xfrm>
+          <a:prstGeom prst="rect">
+            <a:avLst/>
+          </a:prstGeom>
+        </p:spPr>
+      </p:pic>
+    </p:spTree>
+    <p:extLst>
+      <p:ext uri="{BB962C8B-B14F-4D97-AF65-F5344CB8AC3E}">
+        <p14:creationId xmlns:p14="http://schemas.microsoft.com/office/powerpoint/2010/main" val="3997350818"/>
+      </p:ext>
+    </p:extLst>
+  </p:cSld>
+  <p:clrMapOvr>
+    <a:masterClrMapping/>
+  </p:clrMapOvr>
+</p:sld>
+</file>
+
+<file path=ppt/slides/slide34.xml><?xml version="1.0" encoding="utf-8"?>
+<p:sld xmlns:a="http://schemas.openxmlformats.org/drawingml/2006/main" xmlns:r="http://schemas.openxmlformats.org/officeDocument/2006/relationships" xmlns:p="http://schemas.openxmlformats.org/presentationml/2006/main">
+  <p:cSld>
+    <p:spTree>
+      <p:nvGrpSpPr>
+        <p:cNvPr id="1" name=""/>
+        <p:cNvGrpSpPr/>
+        <p:nvPr/>
+      </p:nvGrpSpPr>
+      <p:grpSpPr>
+        <a:xfrm>
+          <a:off x="0" y="0"/>
+          <a:ext cx="0" cy="0"/>
+          <a:chOff x="0" y="0"/>
+          <a:chExt cx="0" cy="0"/>
+        </a:xfrm>
+      </p:grpSpPr>
+      <p:pic>
+        <p:nvPicPr>
+          <p:cNvPr id="5" name="Picture 4">
+            <a:extLst>
+              <a:ext uri="{FF2B5EF4-FFF2-40B4-BE49-F238E27FC236}">
+                <a16:creationId xmlns:a16="http://schemas.microsoft.com/office/drawing/2014/main" id="{360A43D4-AAA7-476C-B9A2-C9F3817D27FB}"/>
+              </a:ext>
+            </a:extLst>
+          </p:cNvPr>
+          <p:cNvPicPr>
+            <a:picLocks noChangeAspect="1"/>
+          </p:cNvPicPr>
+          <p:nvPr/>
+        </p:nvPicPr>
+        <p:blipFill>
+          <a:blip r:embed="rId3"/>
+          <a:stretch>
+            <a:fillRect/>
+          </a:stretch>
+        </p:blipFill>
+        <p:spPr>
+          <a:xfrm>
+            <a:off x="0" y="401744"/>
+            <a:ext cx="12192526" cy="5755988"/>
+          </a:xfrm>
+          <a:prstGeom prst="rect">
+            <a:avLst/>
+          </a:prstGeom>
+        </p:spPr>
+      </p:pic>
+    </p:spTree>
+    <p:extLst>
+      <p:ext uri="{BB962C8B-B14F-4D97-AF65-F5344CB8AC3E}">
+        <p14:creationId xmlns:p14="http://schemas.microsoft.com/office/powerpoint/2010/main" val="2241295816"/>
       </p:ext>
     </p:extLst>
   </p:cSld>

</xml_diff>